<commit_message>
week 3 stuff, 4440
</commit_message>
<xml_diff>
--- a/assets/courses/malware/spring2017/slides/week02/x86.pptx
+++ b/assets/courses/malware/spring2017/slides/week02/x86.pptx
@@ -16789,7 +16789,7 @@
           <a:graphicData uri="http://schemas.openxmlformats.org/presentationml/2006/ole">
             <mc:AlternateContent xmlns:mc="http://schemas.openxmlformats.org/markup-compatibility/2006">
               <mc:Choice xmlns:v="urn:schemas-microsoft-com:vml" Requires="v">
-                <p:oleObj spid="_x0000_s38943" name="Visio" r:id="rId7" imgW="2898648" imgH="3802075" progId="">
+                <p:oleObj spid="_x0000_s38945" name="Visio" r:id="rId7" imgW="2898648" imgH="3802075" progId="">
                   <p:embed/>
                 </p:oleObj>
               </mc:Choice>
@@ -17022,7 +17022,7 @@
           <a:graphicData uri="http://schemas.openxmlformats.org/presentationml/2006/ole">
             <mc:AlternateContent xmlns:mc="http://schemas.openxmlformats.org/markup-compatibility/2006">
               <mc:Choice xmlns:v="urn:schemas-microsoft-com:vml" Requires="v">
-                <p:oleObj spid="_x0000_s40991" name="Visio" r:id="rId7" imgW="2898648" imgH="4030675" progId="">
+                <p:oleObj spid="_x0000_s40993" name="Visio" r:id="rId7" imgW="2898648" imgH="4030675" progId="">
                   <p:embed/>
                 </p:oleObj>
               </mc:Choice>
@@ -17255,7 +17255,7 @@
           <a:graphicData uri="http://schemas.openxmlformats.org/presentationml/2006/ole">
             <mc:AlternateContent xmlns:mc="http://schemas.openxmlformats.org/markup-compatibility/2006">
               <mc:Choice xmlns:v="urn:schemas-microsoft-com:vml" Requires="v">
-                <p:oleObj spid="_x0000_s43039" name="Visio" r:id="rId7" imgW="2898648" imgH="4259275" progId="">
+                <p:oleObj spid="_x0000_s43041" name="Visio" r:id="rId7" imgW="2898648" imgH="4259275" progId="">
                   <p:embed/>
                 </p:oleObj>
               </mc:Choice>
@@ -17488,7 +17488,7 @@
           <a:graphicData uri="http://schemas.openxmlformats.org/presentationml/2006/ole">
             <mc:AlternateContent xmlns:mc="http://schemas.openxmlformats.org/markup-compatibility/2006">
               <mc:Choice xmlns:v="urn:schemas-microsoft-com:vml" Requires="v">
-                <p:oleObj spid="_x0000_s45087" name="Visio" r:id="rId7" imgW="3127248" imgH="4373575" progId="">
+                <p:oleObj spid="_x0000_s45089" name="Visio" r:id="rId7" imgW="3127248" imgH="4373575" progId="">
                   <p:embed/>
                 </p:oleObj>
               </mc:Choice>
@@ -18943,7 +18943,7 @@
           <a:graphicData uri="http://schemas.openxmlformats.org/presentationml/2006/ole">
             <mc:AlternateContent xmlns:mc="http://schemas.openxmlformats.org/markup-compatibility/2006">
               <mc:Choice xmlns:v="urn:schemas-microsoft-com:vml" Requires="v">
-                <p:oleObj spid="_x0000_s55327" name="Visio" r:id="rId7" imgW="4146499" imgH="3459175" progId="">
+                <p:oleObj spid="_x0000_s55329" name="Visio" r:id="rId7" imgW="4146499" imgH="3459175" progId="">
                   <p:embed/>
                 </p:oleObj>
               </mc:Choice>
@@ -19185,7 +19185,7 @@
           <a:graphicData uri="http://schemas.openxmlformats.org/presentationml/2006/ole">
             <mc:AlternateContent xmlns:mc="http://schemas.openxmlformats.org/markup-compatibility/2006">
               <mc:Choice xmlns:v="urn:schemas-microsoft-com:vml" Requires="v">
-                <p:oleObj spid="_x0000_s57375" name="Visio" r:id="rId7" imgW="4146499" imgH="3459175" progId="">
+                <p:oleObj spid="_x0000_s57377" name="Visio" r:id="rId7" imgW="4146499" imgH="3459175" progId="">
                   <p:embed/>
                 </p:oleObj>
               </mc:Choice>
@@ -20120,7 +20120,7 @@
           <a:graphicData uri="http://schemas.openxmlformats.org/presentationml/2006/ole">
             <mc:AlternateContent xmlns:mc="http://schemas.openxmlformats.org/markup-compatibility/2006">
               <mc:Choice xmlns:v="urn:schemas-microsoft-com:vml" Requires="v">
-                <p:oleObj spid="_x0000_s65567" name="Visio" r:id="rId7" imgW="3917899" imgH="4144975" progId="">
+                <p:oleObj spid="_x0000_s65569" name="Visio" r:id="rId7" imgW="3917899" imgH="4144975" progId="">
                   <p:embed/>
                 </p:oleObj>
               </mc:Choice>
@@ -21160,7 +21160,7 @@
           <a:graphicData uri="http://schemas.openxmlformats.org/presentationml/2006/ole">
             <mc:AlternateContent xmlns:mc="http://schemas.openxmlformats.org/markup-compatibility/2006">
               <mc:Choice xmlns:v="urn:schemas-microsoft-com:vml" Requires="v">
-                <p:oleObj spid="_x0000_s73759" name="Visio" r:id="rId7" imgW="5124298" imgH="3916375" progId="">
+                <p:oleObj spid="_x0000_s73761" name="Visio" r:id="rId7" imgW="5124298" imgH="3916375" progId="">
                   <p:embed/>
                 </p:oleObj>
               </mc:Choice>
@@ -21904,7 +21904,7 @@
           <a:graphicData uri="http://schemas.openxmlformats.org/presentationml/2006/ole">
             <mc:AlternateContent xmlns:mc="http://schemas.openxmlformats.org/markup-compatibility/2006">
               <mc:Choice xmlns:v="urn:schemas-microsoft-com:vml" Requires="v">
-                <p:oleObj spid="_x0000_s77856" name="Visio" r:id="rId7" imgW="5197063" imgH="5145417" progId="">
+                <p:oleObj spid="_x0000_s77858" name="Visio" r:id="rId7" imgW="5197063" imgH="5145417" progId="">
                   <p:embed/>
                 </p:oleObj>
               </mc:Choice>
@@ -22465,7 +22465,7 @@
           <a:graphicData uri="http://schemas.openxmlformats.org/presentationml/2006/ole">
             <mc:AlternateContent xmlns:mc="http://schemas.openxmlformats.org/markup-compatibility/2006">
               <mc:Choice xmlns:v="urn:schemas-microsoft-com:vml" Requires="v">
-                <p:oleObj spid="_x0000_s81951" name="Visio" r:id="rId7" imgW="5197063" imgH="4054037" progId="">
+                <p:oleObj spid="_x0000_s81953" name="Visio" r:id="rId7" imgW="5197063" imgH="4054037" progId="">
                   <p:embed/>
                 </p:oleObj>
               </mc:Choice>
@@ -23051,7 +23051,7 @@
           <a:graphicData uri="http://schemas.openxmlformats.org/presentationml/2006/ole">
             <mc:AlternateContent xmlns:mc="http://schemas.openxmlformats.org/markup-compatibility/2006">
               <mc:Choice xmlns:v="urn:schemas-microsoft-com:vml" Requires="v">
-                <p:oleObj spid="_x0000_s86047" name="Visio" r:id="rId7" imgW="5124298" imgH="3916375" progId="">
+                <p:oleObj spid="_x0000_s86049" name="Visio" r:id="rId7" imgW="5124298" imgH="3916375" progId="">
                   <p:embed/>
                 </p:oleObj>
               </mc:Choice>
@@ -23442,30 +23442,13 @@
             </a:pPr>
             <a:r>
               <a:rPr lang="en-US" sz="2800" dirty="0"/>
-              <a:t>We saw an example with buffer overflows</a:t>
-            </a:r>
-          </a:p>
-          <a:p>
-            <a:pPr defTabSz="911225" eaLnBrk="1" hangingPunct="1">
-              <a:tabLst>
-                <a:tab pos="623888" algn="l"/>
-              </a:tabLst>
-            </a:pPr>
-            <a:r>
-              <a:rPr lang="en-US" sz="2800" smtClean="0"/>
-              <a:t>E.g</a:t>
+              <a:t>We saw an example with buffer </a:t>
             </a:r>
             <a:r>
               <a:rPr lang="en-US" sz="2800" dirty="0" smtClean="0"/>
-              <a:t>.,  </a:t>
-            </a:r>
-            <a:r>
-              <a:rPr lang="en-US" sz="2800" dirty="0"/>
-              <a:t>“Tricky Jump” document on web page for another virus technique</a:t>
-            </a:r>
-            <a:endParaRPr lang="en-US" sz="1800" dirty="0">
-              <a:latin typeface="Courier New" charset="0"/>
-            </a:endParaRPr>
+              <a:t>overflows</a:t>
+            </a:r>
+            <a:endParaRPr lang="en-US" sz="2800" dirty="0"/>
           </a:p>
         </p:txBody>
       </p:sp>
@@ -24478,7 +24461,7 @@
           <a:graphicData uri="http://schemas.openxmlformats.org/presentationml/2006/ole">
             <mc:AlternateContent xmlns:mc="http://schemas.openxmlformats.org/markup-compatibility/2006">
               <mc:Choice xmlns:v="urn:schemas-microsoft-com:vml" Requires="v">
-                <p:oleObj spid="_x0000_s94239" name="Visio" r:id="rId7" imgW="6762100" imgH="5562698" progId="">
+                <p:oleObj spid="_x0000_s94241" name="Visio" r:id="rId7" imgW="6762100" imgH="5562698" progId="">
                   <p:embed/>
                 </p:oleObj>
               </mc:Choice>
@@ -24946,7 +24929,7 @@
           <a:graphicData uri="http://schemas.openxmlformats.org/presentationml/2006/ole">
             <mc:AlternateContent xmlns:mc="http://schemas.openxmlformats.org/markup-compatibility/2006">
               <mc:Choice xmlns:v="urn:schemas-microsoft-com:vml" Requires="v">
-                <p:oleObj spid="_x0000_s98336" name="Visio" r:id="rId7" imgW="5403732" imgH="6197941" progId="">
+                <p:oleObj spid="_x0000_s98338" name="Visio" r:id="rId7" imgW="5403732" imgH="6197941" progId="">
                   <p:embed/>
                 </p:oleObj>
               </mc:Choice>
@@ -26056,7 +26039,7 @@
           <a:graphicData uri="http://schemas.openxmlformats.org/presentationml/2006/ole">
             <mc:AlternateContent xmlns:mc="http://schemas.openxmlformats.org/markup-compatibility/2006">
               <mc:Choice xmlns:v="urn:schemas-microsoft-com:vml" Requires="v">
-                <p:oleObj spid="_x0000_s24607" name="VISIO" r:id="rId7" imgW="5520960" imgH="4492440" progId="">
+                <p:oleObj spid="_x0000_s24609" name="VISIO" r:id="rId7" imgW="5520960" imgH="4492440" progId="">
                   <p:embed/>
                 </p:oleObj>
               </mc:Choice>
@@ -28010,7 +27993,7 @@
           <a:graphicData uri="http://schemas.openxmlformats.org/presentationml/2006/ole">
             <mc:AlternateContent xmlns:mc="http://schemas.openxmlformats.org/markup-compatibility/2006">
               <mc:Choice xmlns:v="urn:schemas-microsoft-com:vml" Requires="v">
-                <p:oleObj spid="_x0000_s26655" name="VISIO" r:id="rId7" imgW="5691960" imgH="3926880" progId="">
+                <p:oleObj spid="_x0000_s26657" name="VISIO" r:id="rId7" imgW="5691960" imgH="3926880" progId="">
                   <p:embed/>
                 </p:oleObj>
               </mc:Choice>

</xml_diff>